<commit_message>
aktualizovani postupu instalace UWP app
</commit_message>
<xml_diff>
--- a/BadgesTerminal/Dokuments/Postup instalace aplikace.pptx
+++ b/BadgesTerminal/Dokuments/Postup instalace aplikace.pptx
@@ -116,6 +116,96 @@
 </p:presentation>
 </file>
 
+<file path=ppt/revisionInfo.xml><?xml version="1.0" encoding="utf-8"?>
+<p1510:revInfo xmlns:a="http://schemas.openxmlformats.org/drawingml/2006/main" xmlns:r="http://schemas.openxmlformats.org/officeDocument/2006/relationships" xmlns:p1510="http://schemas.microsoft.com/office/powerpoint/2015/10/main">
+  <p1510:revLst>
+    <p1510:client id="{6FEEC065-24C4-479A-9CF0-34AF815448B5}" v="3" dt="2021-06-22T22:05:20.769"/>
+  </p1510:revLst>
+</p1510:revInfo>
+</file>
+
+<file path=ppt/changesInfos/changesInfo1.xml><?xml version="1.0" encoding="utf-8"?>
+<pc:chgInfo xmlns:a="http://schemas.openxmlformats.org/drawingml/2006/main" xmlns:r="http://schemas.openxmlformats.org/officeDocument/2006/relationships" xmlns:ac="http://schemas.microsoft.com/office/drawing/2013/main/command" xmlns:pc="http://schemas.microsoft.com/office/powerpoint/2013/main/command">
+  <pc:docChgLst>
+    <pc:chgData name="M S" userId="8cf6166d1146cb28" providerId="LiveId" clId="{6FEEC065-24C4-479A-9CF0-34AF815448B5}"/>
+    <pc:docChg chg="undo custSel modSld">
+      <pc:chgData name="M S" userId="8cf6166d1146cb28" providerId="LiveId" clId="{6FEEC065-24C4-479A-9CF0-34AF815448B5}" dt="2021-06-22T22:05:15.475" v="18" actId="732"/>
+      <pc:docMkLst>
+        <pc:docMk/>
+      </pc:docMkLst>
+      <pc:sldChg chg="modSp mod">
+        <pc:chgData name="M S" userId="8cf6166d1146cb28" providerId="LiveId" clId="{6FEEC065-24C4-479A-9CF0-34AF815448B5}" dt="2021-06-22T22:03:18.168" v="9" actId="20577"/>
+        <pc:sldMkLst>
+          <pc:docMk/>
+          <pc:sldMk cId="2357031413" sldId="256"/>
+        </pc:sldMkLst>
+        <pc:spChg chg="mod">
+          <ac:chgData name="M S" userId="8cf6166d1146cb28" providerId="LiveId" clId="{6FEEC065-24C4-479A-9CF0-34AF815448B5}" dt="2021-06-22T22:03:18.168" v="9" actId="20577"/>
+          <ac:spMkLst>
+            <pc:docMk/>
+            <pc:sldMk cId="2357031413" sldId="256"/>
+            <ac:spMk id="3" creationId="{0ECA6402-2E93-4CA0-8F9A-CF85914846ED}"/>
+          </ac:spMkLst>
+        </pc:spChg>
+      </pc:sldChg>
+      <pc:sldChg chg="modSp mod">
+        <pc:chgData name="M S" userId="8cf6166d1146cb28" providerId="LiveId" clId="{6FEEC065-24C4-479A-9CF0-34AF815448B5}" dt="2021-06-22T22:04:49.282" v="16" actId="732"/>
+        <pc:sldMkLst>
+          <pc:docMk/>
+          <pc:sldMk cId="2931907626" sldId="258"/>
+        </pc:sldMkLst>
+        <pc:picChg chg="mod modCrop">
+          <ac:chgData name="M S" userId="8cf6166d1146cb28" providerId="LiveId" clId="{6FEEC065-24C4-479A-9CF0-34AF815448B5}" dt="2021-06-22T22:04:49.282" v="16" actId="732"/>
+          <ac:picMkLst>
+            <pc:docMk/>
+            <pc:sldMk cId="2931907626" sldId="258"/>
+            <ac:picMk id="23" creationId="{F0C1489F-C851-4B39-8374-5A6918CF5945}"/>
+          </ac:picMkLst>
+        </pc:picChg>
+      </pc:sldChg>
+      <pc:sldChg chg="modSp mod">
+        <pc:chgData name="M S" userId="8cf6166d1146cb28" providerId="LiveId" clId="{6FEEC065-24C4-479A-9CF0-34AF815448B5}" dt="2021-06-22T22:05:15.475" v="18" actId="732"/>
+        <pc:sldMkLst>
+          <pc:docMk/>
+          <pc:sldMk cId="17046503" sldId="259"/>
+        </pc:sldMkLst>
+        <pc:picChg chg="mod modCrop">
+          <ac:chgData name="M S" userId="8cf6166d1146cb28" providerId="LiveId" clId="{6FEEC065-24C4-479A-9CF0-34AF815448B5}" dt="2021-06-22T22:05:15.475" v="18" actId="732"/>
+          <ac:picMkLst>
+            <pc:docMk/>
+            <pc:sldMk cId="17046503" sldId="259"/>
+            <ac:picMk id="9" creationId="{17D333E7-93AD-43DF-A5CD-6BCC9D905F81}"/>
+          </ac:picMkLst>
+        </pc:picChg>
+      </pc:sldChg>
+      <pc:sldChg chg="modSp mod">
+        <pc:chgData name="M S" userId="8cf6166d1146cb28" providerId="LiveId" clId="{6FEEC065-24C4-479A-9CF0-34AF815448B5}" dt="2021-06-22T22:04:19.803" v="14" actId="732"/>
+        <pc:sldMkLst>
+          <pc:docMk/>
+          <pc:sldMk cId="3715989172" sldId="261"/>
+        </pc:sldMkLst>
+        <pc:grpChg chg="mod">
+          <ac:chgData name="M S" userId="8cf6166d1146cb28" providerId="LiveId" clId="{6FEEC065-24C4-479A-9CF0-34AF815448B5}" dt="2021-06-22T22:03:51.663" v="11" actId="14100"/>
+          <ac:grpSpMkLst>
+            <pc:docMk/>
+            <pc:sldMk cId="3715989172" sldId="261"/>
+            <ac:grpSpMk id="36" creationId="{5C832927-42B0-43C1-9EF0-0BA87E3C767D}"/>
+          </ac:grpSpMkLst>
+        </pc:grpChg>
+        <pc:picChg chg="mod modCrop">
+          <ac:chgData name="M S" userId="8cf6166d1146cb28" providerId="LiveId" clId="{6FEEC065-24C4-479A-9CF0-34AF815448B5}" dt="2021-06-22T22:04:19.803" v="14" actId="732"/>
+          <ac:picMkLst>
+            <pc:docMk/>
+            <pc:sldMk cId="3715989172" sldId="261"/>
+            <ac:picMk id="35" creationId="{D0B8E936-614A-40E7-8A1A-D4D9B13D9E3E}"/>
+          </ac:picMkLst>
+        </pc:picChg>
+      </pc:sldChg>
+    </pc:docChg>
+  </pc:docChgLst>
+</pc:chgInfo>
+</file>
+
 <file path=ppt/slideLayouts/slideLayout1.xml><?xml version="1.0" encoding="utf-8"?>
 <p:sldLayout xmlns:a="http://schemas.openxmlformats.org/drawingml/2006/main" xmlns:r="http://schemas.openxmlformats.org/officeDocument/2006/relationships" xmlns:p="http://schemas.openxmlformats.org/presentationml/2006/main" showMasterSp="0" type="title" preserve="1">
   <p:cSld name="Úvodní snímek">
@@ -284,7 +374,7 @@
           <a:p>
             <a:fld id="{96F23511-F718-4647-81BE-81E96D2F5500}" type="datetimeFigureOut">
               <a:rPr lang="cs-CZ" smtClean="0"/>
-              <a:t>02.05.2021</a:t>
+              <a:t>23.06.2021</a:t>
             </a:fld>
             <a:endParaRPr lang="cs-CZ"/>
           </a:p>
@@ -512,7 +602,7 @@
           <a:p>
             <a:fld id="{96F23511-F718-4647-81BE-81E96D2F5500}" type="datetimeFigureOut">
               <a:rPr lang="cs-CZ" smtClean="0"/>
-              <a:t>02.05.2021</a:t>
+              <a:t>23.06.2021</a:t>
             </a:fld>
             <a:endParaRPr lang="cs-CZ"/>
           </a:p>
@@ -692,7 +782,7 @@
           <a:p>
             <a:fld id="{96F23511-F718-4647-81BE-81E96D2F5500}" type="datetimeFigureOut">
               <a:rPr lang="cs-CZ" smtClean="0"/>
-              <a:t>02.05.2021</a:t>
+              <a:t>23.06.2021</a:t>
             </a:fld>
             <a:endParaRPr lang="cs-CZ"/>
           </a:p>
@@ -862,7 +952,7 @@
           <a:p>
             <a:fld id="{96F23511-F718-4647-81BE-81E96D2F5500}" type="datetimeFigureOut">
               <a:rPr lang="cs-CZ" smtClean="0"/>
-              <a:t>02.05.2021</a:t>
+              <a:t>23.06.2021</a:t>
             </a:fld>
             <a:endParaRPr lang="cs-CZ"/>
           </a:p>
@@ -1116,7 +1206,7 @@
           <a:p>
             <a:fld id="{96F23511-F718-4647-81BE-81E96D2F5500}" type="datetimeFigureOut">
               <a:rPr lang="cs-CZ" smtClean="0"/>
-              <a:t>02.05.2021</a:t>
+              <a:t>23.06.2021</a:t>
             </a:fld>
             <a:endParaRPr lang="cs-CZ"/>
           </a:p>
@@ -1442,7 +1532,7 @@
           <a:p>
             <a:fld id="{96F23511-F718-4647-81BE-81E96D2F5500}" type="datetimeFigureOut">
               <a:rPr lang="cs-CZ" smtClean="0"/>
-              <a:t>02.05.2021</a:t>
+              <a:t>23.06.2021</a:t>
             </a:fld>
             <a:endParaRPr lang="cs-CZ"/>
           </a:p>
@@ -1893,7 +1983,7 @@
           <a:p>
             <a:fld id="{96F23511-F718-4647-81BE-81E96D2F5500}" type="datetimeFigureOut">
               <a:rPr lang="cs-CZ" smtClean="0"/>
-              <a:t>02.05.2021</a:t>
+              <a:t>23.06.2021</a:t>
             </a:fld>
             <a:endParaRPr lang="cs-CZ"/>
           </a:p>
@@ -2011,7 +2101,7 @@
           <a:p>
             <a:fld id="{96F23511-F718-4647-81BE-81E96D2F5500}" type="datetimeFigureOut">
               <a:rPr lang="cs-CZ" smtClean="0"/>
-              <a:t>02.05.2021</a:t>
+              <a:t>23.06.2021</a:t>
             </a:fld>
             <a:endParaRPr lang="cs-CZ"/>
           </a:p>
@@ -2106,7 +2196,7 @@
           <a:p>
             <a:fld id="{96F23511-F718-4647-81BE-81E96D2F5500}" type="datetimeFigureOut">
               <a:rPr lang="cs-CZ" smtClean="0"/>
-              <a:t>02.05.2021</a:t>
+              <a:t>23.06.2021</a:t>
             </a:fld>
             <a:endParaRPr lang="cs-CZ"/>
           </a:p>
@@ -2393,7 +2483,7 @@
           <a:p>
             <a:fld id="{96F23511-F718-4647-81BE-81E96D2F5500}" type="datetimeFigureOut">
               <a:rPr lang="cs-CZ" smtClean="0"/>
-              <a:t>02.05.2021</a:t>
+              <a:t>23.06.2021</a:t>
             </a:fld>
             <a:endParaRPr lang="cs-CZ"/>
           </a:p>
@@ -2715,7 +2805,7 @@
           <a:p>
             <a:fld id="{96F23511-F718-4647-81BE-81E96D2F5500}" type="datetimeFigureOut">
               <a:rPr lang="cs-CZ" smtClean="0"/>
-              <a:t>02.05.2021</a:t>
+              <a:t>23.06.2021</a:t>
             </a:fld>
             <a:endParaRPr lang="cs-CZ"/>
           </a:p>
@@ -2969,7 +3059,7 @@
           <a:p>
             <a:fld id="{96F23511-F718-4647-81BE-81E96D2F5500}" type="datetimeFigureOut">
               <a:rPr lang="cs-CZ" smtClean="0"/>
-              <a:t>02.05.2021</a:t>
+              <a:t>23.06.2021</a:t>
             </a:fld>
             <a:endParaRPr lang="cs-CZ"/>
           </a:p>
@@ -3848,9 +3938,9 @@
         <p:grpSpPr>
           <a:xfrm>
             <a:off x="73826" y="1167915"/>
-            <a:ext cx="4191838" cy="2694255"/>
+            <a:ext cx="4191838" cy="2575410"/>
             <a:chOff x="38228" y="602800"/>
-            <a:chExt cx="4191838" cy="2694255"/>
+            <a:chExt cx="4191838" cy="2575410"/>
           </a:xfrm>
         </p:grpSpPr>
         <p:pic>
@@ -3867,16 +3957,21 @@
             </p:cNvPicPr>
             <p:nvPr/>
           </p:nvPicPr>
-          <p:blipFill>
-            <a:blip r:embed="rId2"/>
-            <a:stretch>
-              <a:fillRect/>
-            </a:stretch>
+          <p:blipFill rotWithShape="1">
+            <a:blip r:embed="rId2" cstate="hqprint">
+              <a:extLst>
+                <a:ext uri="{28A0092B-C50C-407E-A947-70E740481C1C}">
+                  <a14:useLocalDpi xmlns:a14="http://schemas.microsoft.com/office/drawing/2010/main"/>
+                </a:ext>
+              </a:extLst>
+            </a:blip>
+            <a:srcRect/>
+            <a:stretch/>
           </p:blipFill>
           <p:spPr>
             <a:xfrm>
-              <a:off x="70774" y="957453"/>
-              <a:ext cx="4159292" cy="2339602"/>
+              <a:off x="386554" y="1126207"/>
+              <a:ext cx="3843512" cy="2052003"/>
             </a:xfrm>
             <a:prstGeom prst="rect">
               <a:avLst/>
@@ -4631,16 +4726,21 @@
           </p:cNvPicPr>
           <p:nvPr/>
         </p:nvPicPr>
-        <p:blipFill>
-          <a:blip r:embed="rId2"/>
-          <a:stretch>
-            <a:fillRect/>
-          </a:stretch>
+        <p:blipFill rotWithShape="1">
+          <a:blip r:embed="rId2" cstate="hqprint">
+            <a:extLst>
+              <a:ext uri="{28A0092B-C50C-407E-A947-70E740481C1C}">
+                <a14:useLocalDpi xmlns:a14="http://schemas.microsoft.com/office/drawing/2010/main"/>
+              </a:ext>
+            </a:extLst>
+          </a:blip>
+          <a:srcRect/>
+          <a:stretch/>
         </p:blipFill>
         <p:spPr>
           <a:xfrm>
-            <a:off x="198964" y="1658662"/>
-            <a:ext cx="4705194" cy="2548647"/>
+            <a:off x="569134" y="1857375"/>
+            <a:ext cx="4335024" cy="2349934"/>
           </a:xfrm>
           <a:prstGeom prst="rect">
             <a:avLst/>
@@ -5299,16 +5399,21 @@
             </p:cNvPicPr>
             <p:nvPr/>
           </p:nvPicPr>
-          <p:blipFill>
-            <a:blip r:embed="rId2"/>
-            <a:stretch>
-              <a:fillRect/>
-            </a:stretch>
+          <p:blipFill rotWithShape="1">
+            <a:blip r:embed="rId2" cstate="hqprint">
+              <a:extLst>
+                <a:ext uri="{28A0092B-C50C-407E-A947-70E740481C1C}">
+                  <a14:useLocalDpi xmlns:a14="http://schemas.microsoft.com/office/drawing/2010/main"/>
+                </a:ext>
+              </a:extLst>
+            </a:blip>
+            <a:srcRect/>
+            <a:stretch/>
           </p:blipFill>
           <p:spPr>
             <a:xfrm>
-              <a:off x="227694" y="1327547"/>
-              <a:ext cx="4724398" cy="2559049"/>
+              <a:off x="579072" y="1516380"/>
+              <a:ext cx="4373020" cy="2370216"/>
             </a:xfrm>
             <a:prstGeom prst="rect">
               <a:avLst/>

</xml_diff>